<commit_message>
Updated slides for devLINK
</commit_message>
<xml_diff>
--- a/TestDrivingASP.NETMVC_Short.pptx
+++ b/TestDrivingASP.NETMVC_Short.pptx
@@ -166,6 +166,36 @@
       </a:defRPr>
     </a:lvl9pPr>
   </p:defaultTextStyle>
+  <p:extLst>
+    <p:ext uri="{EFAFB233-063F-42B5-8137-9DF3F51BA10A}">
+      <p15:sldGuideLst xmlns:p15="http://schemas.microsoft.com/office/powerpoint/2012/main">
+        <p15:guide id="1" orient="horz" pos="2304">
+          <p15:clr>
+            <a:srgbClr val="A4A3A4"/>
+          </p15:clr>
+        </p15:guide>
+        <p15:guide id="2" pos="2919">
+          <p15:clr>
+            <a:srgbClr val="A4A3A4"/>
+          </p15:clr>
+        </p15:guide>
+      </p15:sldGuideLst>
+    </p:ext>
+    <p:ext uri="{2D200454-40CA-4A62-9FC3-DE9A4176ACB9}">
+      <p15:notesGuideLst xmlns:p15="http://schemas.microsoft.com/office/powerpoint/2012/main">
+        <p15:guide id="1" orient="horz" pos="2928">
+          <p15:clr>
+            <a:srgbClr val="A4A3A4"/>
+          </p15:clr>
+        </p15:guide>
+        <p15:guide id="2" pos="2208">
+          <p15:clr>
+            <a:srgbClr val="A4A3A4"/>
+          </p15:clr>
+        </p15:guide>
+      </p15:notesGuideLst>
+    </p:ext>
+  </p:extLst>
 </p:presentation>
 </file>
 
@@ -487,7 +517,7 @@
               <a:pPr>
                 <a:defRPr/>
               </a:pPr>
-              <a:t>7/14/2012</a:t>
+              <a:t>8/20/2012</a:t>
             </a:fld>
             <a:endParaRPr lang="en-US"/>
           </a:p>
@@ -986,11 +1016,7 @@
             <a:pPr lvl="1"/>
             <a:r>
               <a:rPr lang="en-US" sz="2100" dirty="0" smtClean="0"/>
-              <a:t>Reducing the time needed to resolve </a:t>
-            </a:r>
-            <a:r>
-              <a:rPr lang="en-US" sz="2100" dirty="0" smtClean="0"/>
-              <a:t>bugs</a:t>
+              <a:t>Reducing the time needed to resolve bugs</a:t>
             </a:r>
           </a:p>
           <a:p>
@@ -1005,7 +1031,7 @@
             </a:r>
             <a:r>
               <a:rPr lang="en-US" sz="2100" b="1" baseline="0" dirty="0" smtClean="0"/>
-              <a:t> one left of the list!?!?!</a:t>
+              <a:t> one left off the list!?!?!</a:t>
             </a:r>
             <a:endParaRPr lang="en-US" sz="2100" b="1" dirty="0" smtClean="0"/>
           </a:p>
@@ -1047,6 +1073,11 @@
         </p:txBody>
       </p:sp>
     </p:spTree>
+    <p:extLst>
+      <p:ext uri="{BB962C8B-B14F-4D97-AF65-F5344CB8AC3E}">
+        <p14:creationId xmlns:p14="http://schemas.microsoft.com/office/powerpoint/2010/main" val="1871400418"/>
+      </p:ext>
+    </p:extLst>
   </p:cSld>
   <p:clrMapOvr>
     <a:masterClrMapping/>
@@ -1233,6 +1264,11 @@
         </p:txBody>
       </p:sp>
     </p:spTree>
+    <p:extLst>
+      <p:ext uri="{BB962C8B-B14F-4D97-AF65-F5344CB8AC3E}">
+        <p14:creationId xmlns:p14="http://schemas.microsoft.com/office/powerpoint/2010/main" val="2829013094"/>
+      </p:ext>
+    </p:extLst>
   </p:cSld>
   <p:clrMapOvr>
     <a:masterClrMapping/>
@@ -1349,6 +1385,11 @@
         </p:txBody>
       </p:sp>
     </p:spTree>
+    <p:extLst>
+      <p:ext uri="{BB962C8B-B14F-4D97-AF65-F5344CB8AC3E}">
+        <p14:creationId xmlns:p14="http://schemas.microsoft.com/office/powerpoint/2010/main" val="965888375"/>
+      </p:ext>
+    </p:extLst>
   </p:cSld>
   <p:clrMapOvr>
     <a:masterClrMapping/>
@@ -1582,6 +1623,11 @@
         </p:txBody>
       </p:sp>
     </p:spTree>
+    <p:extLst>
+      <p:ext uri="{BB962C8B-B14F-4D97-AF65-F5344CB8AC3E}">
+        <p14:creationId xmlns:p14="http://schemas.microsoft.com/office/powerpoint/2010/main" val="3357138803"/>
+      </p:ext>
+    </p:extLst>
   </p:cSld>
   <p:clrMapOvr>
     <a:masterClrMapping/>
@@ -1874,9 +1920,6 @@
               </a:rPr>
               <a:t>	</a:t>
             </a:r>
-            <a:endParaRPr lang="en-US" sz="1200" baseline="0" dirty="0" smtClean="0">
-              <a:sym typeface="Wingdings" pitchFamily="2" charset="2"/>
-            </a:endParaRPr>
           </a:p>
         </p:txBody>
       </p:sp>
@@ -1916,6 +1959,11 @@
         </p:txBody>
       </p:sp>
     </p:spTree>
+    <p:extLst>
+      <p:ext uri="{BB962C8B-B14F-4D97-AF65-F5344CB8AC3E}">
+        <p14:creationId xmlns:p14="http://schemas.microsoft.com/office/powerpoint/2010/main" val="4259944128"/>
+      </p:ext>
+    </p:extLst>
   </p:cSld>
   <p:clrMapOvr>
     <a:masterClrMapping/>
@@ -2086,6 +2134,11 @@
         </p:txBody>
       </p:sp>
     </p:spTree>
+    <p:extLst>
+      <p:ext uri="{BB962C8B-B14F-4D97-AF65-F5344CB8AC3E}">
+        <p14:creationId xmlns:p14="http://schemas.microsoft.com/office/powerpoint/2010/main" val="629054801"/>
+      </p:ext>
+    </p:extLst>
   </p:cSld>
   <p:clrMapOvr>
     <a:masterClrMapping/>
@@ -2230,6 +2283,11 @@
         </p:txBody>
       </p:sp>
     </p:spTree>
+    <p:extLst>
+      <p:ext uri="{BB962C8B-B14F-4D97-AF65-F5344CB8AC3E}">
+        <p14:creationId xmlns:p14="http://schemas.microsoft.com/office/powerpoint/2010/main" val="1727539427"/>
+      </p:ext>
+    </p:extLst>
   </p:cSld>
   <p:clrMapOvr>
     <a:masterClrMapping/>
@@ -2480,6 +2538,11 @@
         </p:txBody>
       </p:sp>
     </p:spTree>
+    <p:extLst>
+      <p:ext uri="{BB962C8B-B14F-4D97-AF65-F5344CB8AC3E}">
+        <p14:creationId xmlns:p14="http://schemas.microsoft.com/office/powerpoint/2010/main" val="3810863373"/>
+      </p:ext>
+    </p:extLst>
   </p:cSld>
   <p:clrMapOvr>
     <a:masterClrMapping/>
@@ -2767,6 +2830,11 @@
         </p:txBody>
       </p:sp>
     </p:spTree>
+    <p:extLst>
+      <p:ext uri="{BB962C8B-B14F-4D97-AF65-F5344CB8AC3E}">
+        <p14:creationId xmlns:p14="http://schemas.microsoft.com/office/powerpoint/2010/main" val="3112729493"/>
+      </p:ext>
+    </p:extLst>
   </p:cSld>
   <p:clrMapOvr>
     <a:masterClrMapping/>
@@ -3001,6 +3069,11 @@
         </p:txBody>
       </p:sp>
     </p:spTree>
+    <p:extLst>
+      <p:ext uri="{BB962C8B-B14F-4D97-AF65-F5344CB8AC3E}">
+        <p14:creationId xmlns:p14="http://schemas.microsoft.com/office/powerpoint/2010/main" val="750347718"/>
+      </p:ext>
+    </p:extLst>
   </p:cSld>
   <p:clrMapOvr>
     <a:masterClrMapping/>
@@ -3116,6 +3189,11 @@
         </p:txBody>
       </p:sp>
     </p:spTree>
+    <p:extLst>
+      <p:ext uri="{BB962C8B-B14F-4D97-AF65-F5344CB8AC3E}">
+        <p14:creationId xmlns:p14="http://schemas.microsoft.com/office/powerpoint/2010/main" val="1147174877"/>
+      </p:ext>
+    </p:extLst>
   </p:cSld>
   <p:clrMapOvr>
     <a:masterClrMapping/>
@@ -3282,6 +3360,11 @@
         </p:txBody>
       </p:sp>
     </p:spTree>
+    <p:extLst>
+      <p:ext uri="{BB962C8B-B14F-4D97-AF65-F5344CB8AC3E}">
+        <p14:creationId xmlns:p14="http://schemas.microsoft.com/office/powerpoint/2010/main" val="1391883327"/>
+      </p:ext>
+    </p:extLst>
   </p:cSld>
   <p:clrMapOvr>
     <a:masterClrMapping/>
@@ -3357,7 +3440,6 @@
               <a:rPr lang="en-US" sz="1400" b="1" i="1" baseline="0" dirty="0" smtClean="0"/>
               <a:t>Isolating your routes</a:t>
             </a:r>
-            <a:endParaRPr lang="en-US" sz="1400" b="1" i="1" baseline="0" dirty="0" smtClean="0"/>
           </a:p>
           <a:p>
             <a:pPr marL="800100" lvl="1" indent="-342900" algn="l">
@@ -3366,23 +3448,7 @@
             </a:pPr>
             <a:r>
               <a:rPr lang="en-US" sz="1400" baseline="0" dirty="0" smtClean="0"/>
-              <a:t>Pull </a:t>
-            </a:r>
-            <a:r>
-              <a:rPr lang="en-US" sz="1400" baseline="0" dirty="0" smtClean="0"/>
-              <a:t>up </a:t>
-            </a:r>
-            <a:r>
-              <a:rPr lang="en-US" sz="1400" baseline="0" dirty="0" smtClean="0"/>
-              <a:t>Global.asax.cx– </a:t>
-            </a:r>
-            <a:r>
-              <a:rPr lang="en-US" sz="1400" baseline="0" dirty="0" smtClean="0"/>
-              <a:t>this has changed a bit since MVC3 where the routes used to be defined directly </a:t>
-            </a:r>
-            <a:r>
-              <a:rPr lang="en-US" sz="1400" baseline="0" dirty="0" smtClean="0"/>
-              <a:t>here, but now we have a new class named “</a:t>
+              <a:t>Pull up Global.asax.cx– this has changed a bit since MVC3 where the routes used to be defined directly here, but now we have a new class named “</a:t>
             </a:r>
             <a:r>
               <a:rPr lang="en-US" sz="1400" baseline="0" dirty="0" err="1" smtClean="0"/>
@@ -3392,7 +3458,6 @@
               <a:rPr lang="en-US" sz="1400" baseline="0" dirty="0" smtClean="0"/>
               <a:t>” that that handles registering the routes.	</a:t>
             </a:r>
-            <a:endParaRPr lang="en-US" sz="1400" baseline="0" dirty="0" smtClean="0"/>
           </a:p>
           <a:p>
             <a:pPr marL="800100" lvl="1" indent="-342900" algn="l">
@@ -4026,6 +4091,11 @@
         </p:txBody>
       </p:sp>
     </p:spTree>
+    <p:extLst>
+      <p:ext uri="{BB962C8B-B14F-4D97-AF65-F5344CB8AC3E}">
+        <p14:creationId xmlns:p14="http://schemas.microsoft.com/office/powerpoint/2010/main" val="3919404400"/>
+      </p:ext>
+    </p:extLst>
   </p:cSld>
   <p:clrMapOvr>
     <a:masterClrMapping/>
@@ -4235,6 +4305,11 @@
         </p:txBody>
       </p:sp>
     </p:spTree>
+    <p:extLst>
+      <p:ext uri="{BB962C8B-B14F-4D97-AF65-F5344CB8AC3E}">
+        <p14:creationId xmlns:p14="http://schemas.microsoft.com/office/powerpoint/2010/main" val="2197227964"/>
+      </p:ext>
+    </p:extLst>
   </p:cSld>
   <p:clrMapOvr>
     <a:masterClrMapping/>
@@ -4318,11 +4393,7 @@
             </a:pPr>
             <a:r>
               <a:rPr lang="en-US" sz="1400" baseline="0" dirty="0" smtClean="0"/>
-              <a:t>Controller </a:t>
-            </a:r>
-            <a:r>
-              <a:rPr lang="en-US" sz="1400" baseline="0" dirty="0" smtClean="0"/>
-              <a:t>Project</a:t>
+              <a:t>Controller Project</a:t>
             </a:r>
           </a:p>
           <a:p>
@@ -5728,6 +5799,11 @@
         </p:txBody>
       </p:sp>
     </p:spTree>
+    <p:extLst>
+      <p:ext uri="{BB962C8B-B14F-4D97-AF65-F5344CB8AC3E}">
+        <p14:creationId xmlns:p14="http://schemas.microsoft.com/office/powerpoint/2010/main" val="35288705"/>
+      </p:ext>
+    </p:extLst>
   </p:cSld>
   <p:clrMapOvr>
     <a:masterClrMapping/>
@@ -5848,6 +5924,11 @@
         </p:txBody>
       </p:sp>
     </p:spTree>
+    <p:extLst>
+      <p:ext uri="{BB962C8B-B14F-4D97-AF65-F5344CB8AC3E}">
+        <p14:creationId xmlns:p14="http://schemas.microsoft.com/office/powerpoint/2010/main" val="1980131164"/>
+      </p:ext>
+    </p:extLst>
   </p:cSld>
   <p:clrMapOvr>
     <a:masterClrMapping/>
@@ -7647,6 +7728,11 @@
         </p:txBody>
       </p:sp>
     </p:spTree>
+    <p:extLst>
+      <p:ext uri="{BB962C8B-B14F-4D97-AF65-F5344CB8AC3E}">
+        <p14:creationId xmlns:p14="http://schemas.microsoft.com/office/powerpoint/2010/main" val="2620711359"/>
+      </p:ext>
+    </p:extLst>
   </p:cSld>
   <p:clrMapOvr>
     <a:masterClrMapping/>
@@ -7759,6 +7845,11 @@
         </p:txBody>
       </p:sp>
     </p:spTree>
+    <p:extLst>
+      <p:ext uri="{BB962C8B-B14F-4D97-AF65-F5344CB8AC3E}">
+        <p14:creationId xmlns:p14="http://schemas.microsoft.com/office/powerpoint/2010/main" val="3535760088"/>
+      </p:ext>
+    </p:extLst>
   </p:cSld>
   <p:clrMapOvr>
     <a:masterClrMapping/>
@@ -7874,6 +7965,11 @@
         </p:txBody>
       </p:sp>
     </p:spTree>
+    <p:extLst>
+      <p:ext uri="{BB962C8B-B14F-4D97-AF65-F5344CB8AC3E}">
+        <p14:creationId xmlns:p14="http://schemas.microsoft.com/office/powerpoint/2010/main" val="2002776913"/>
+      </p:ext>
+    </p:extLst>
   </p:cSld>
   <p:clrMapOvr>
     <a:masterClrMapping/>
@@ -7989,6 +8085,11 @@
         </p:txBody>
       </p:sp>
     </p:spTree>
+    <p:extLst>
+      <p:ext uri="{BB962C8B-B14F-4D97-AF65-F5344CB8AC3E}">
+        <p14:creationId xmlns:p14="http://schemas.microsoft.com/office/powerpoint/2010/main" val="1067860311"/>
+      </p:ext>
+    </p:extLst>
   </p:cSld>
   <p:clrMapOvr>
     <a:masterClrMapping/>
@@ -8131,6 +8232,11 @@
         </p:txBody>
       </p:sp>
     </p:spTree>
+    <p:extLst>
+      <p:ext uri="{BB962C8B-B14F-4D97-AF65-F5344CB8AC3E}">
+        <p14:creationId xmlns:p14="http://schemas.microsoft.com/office/powerpoint/2010/main" val="3519688113"/>
+      </p:ext>
+    </p:extLst>
   </p:cSld>
   <p:clrMapOvr>
     <a:masterClrMapping/>
@@ -8266,6 +8372,11 @@
         </p:txBody>
       </p:sp>
     </p:spTree>
+    <p:extLst>
+      <p:ext uri="{BB962C8B-B14F-4D97-AF65-F5344CB8AC3E}">
+        <p14:creationId xmlns:p14="http://schemas.microsoft.com/office/powerpoint/2010/main" val="2685660089"/>
+      </p:ext>
+    </p:extLst>
   </p:cSld>
   <p:clrMapOvr>
     <a:masterClrMapping/>
@@ -8390,6 +8501,11 @@
         </p:txBody>
       </p:sp>
     </p:spTree>
+    <p:extLst>
+      <p:ext uri="{BB962C8B-B14F-4D97-AF65-F5344CB8AC3E}">
+        <p14:creationId xmlns:p14="http://schemas.microsoft.com/office/powerpoint/2010/main" val="3171548584"/>
+      </p:ext>
+    </p:extLst>
   </p:cSld>
   <p:clrMapOvr>
     <a:masterClrMapping/>
@@ -8516,6 +8632,11 @@
         </p:txBody>
       </p:sp>
     </p:spTree>
+    <p:extLst>
+      <p:ext uri="{BB962C8B-B14F-4D97-AF65-F5344CB8AC3E}">
+        <p14:creationId xmlns:p14="http://schemas.microsoft.com/office/powerpoint/2010/main" val="3877136759"/>
+      </p:ext>
+    </p:extLst>
   </p:cSld>
   <p:clrMapOvr>
     <a:masterClrMapping/>
@@ -8647,6 +8768,11 @@
         </p:txBody>
       </p:sp>
     </p:spTree>
+    <p:extLst>
+      <p:ext uri="{BB962C8B-B14F-4D97-AF65-F5344CB8AC3E}">
+        <p14:creationId xmlns:p14="http://schemas.microsoft.com/office/powerpoint/2010/main" val="2535803467"/>
+      </p:ext>
+    </p:extLst>
   </p:cSld>
   <p:clrMapOvr>
     <a:masterClrMapping/>
@@ -8783,6 +8909,11 @@
         </p:txBody>
       </p:sp>
     </p:spTree>
+    <p:extLst>
+      <p:ext uri="{BB962C8B-B14F-4D97-AF65-F5344CB8AC3E}">
+        <p14:creationId xmlns:p14="http://schemas.microsoft.com/office/powerpoint/2010/main" val="2701177983"/>
+      </p:ext>
+    </p:extLst>
   </p:cSld>
   <p:clrMapOvr>
     <a:masterClrMapping/>
@@ -11811,7 +11942,6 @@
               <a:rPr lang="en-US" dirty="0" smtClean="0"/>
               <a:t>Yes…that is exactly what it means!</a:t>
             </a:r>
-            <a:endParaRPr lang="en-US" dirty="0" smtClean="0"/>
           </a:p>
         </p:txBody>
       </p:sp>
@@ -12173,11 +12303,7 @@
             </a:pPr>
             <a:r>
               <a:rPr lang="en-US" dirty="0" smtClean="0"/>
-              <a:t>Unit </a:t>
-            </a:r>
-            <a:r>
-              <a:rPr lang="en-US" dirty="0" smtClean="0"/>
-              <a:t>Testing</a:t>
+              <a:t>Unit Testing</a:t>
             </a:r>
             <a:r>
               <a:rPr lang="en-US" dirty="0"/>
@@ -12185,11 +12311,7 @@
             </a:r>
             <a:r>
               <a:rPr lang="en-US" dirty="0" smtClean="0"/>
-              <a:t>is the</a:t>
-            </a:r>
-            <a:r>
-              <a:rPr lang="en-US" dirty="0" smtClean="0"/>
-              <a:t> </a:t>
+              <a:t>is the </a:t>
             </a:r>
             <a:r>
               <a:rPr lang="en-US" b="1" dirty="0"/>
@@ -12201,11 +12323,7 @@
             </a:r>
             <a:r>
               <a:rPr lang="en-US" dirty="0" smtClean="0"/>
-              <a:t> </a:t>
-            </a:r>
-            <a:r>
-              <a:rPr lang="en-US" dirty="0" smtClean="0"/>
-              <a:t>to TDD</a:t>
+              <a:t> to TDD</a:t>
             </a:r>
           </a:p>
         </p:txBody>
@@ -12402,7 +12520,6 @@
               <a:rPr lang="en-US" dirty="0" smtClean="0"/>
               <a:t>est</a:t>
             </a:r>
-            <a:endParaRPr lang="en-US" dirty="0" smtClean="0"/>
           </a:p>
         </p:txBody>
       </p:sp>
@@ -12668,13 +12785,8 @@
           <a:p>
             <a:r>
               <a:rPr lang="en-US" sz="2800" dirty="0" smtClean="0"/>
-              <a:t>Automated and </a:t>
-            </a:r>
-            <a:r>
-              <a:rPr lang="en-US" sz="2800" dirty="0" smtClean="0"/>
-              <a:t>repeatable</a:t>
-            </a:r>
-            <a:endParaRPr lang="en-US" sz="2800" dirty="0" smtClean="0"/>
+              <a:t>Automated and repeatable</a:t>
+            </a:r>
           </a:p>
           <a:p>
             <a:r>
@@ -12685,11 +12797,7 @@
           <a:p>
             <a:r>
               <a:rPr lang="en-US" sz="2800" dirty="0" smtClean="0"/>
-              <a:t>On demand/push </a:t>
-            </a:r>
-            <a:r>
-              <a:rPr lang="en-US" sz="2800" dirty="0" smtClean="0"/>
-              <a:t>of a button</a:t>
+              <a:t>On demand/push of a button</a:t>
             </a:r>
           </a:p>
           <a:p>
@@ -12917,7 +13025,6 @@
               <a:rPr lang="en-US" dirty="0" smtClean="0"/>
               <a:t>tuff</a:t>
             </a:r>
-            <a:endParaRPr lang="en-US" dirty="0" smtClean="0"/>
           </a:p>
         </p:txBody>
       </p:sp>
@@ -15693,7 +15800,6 @@
               <a:rPr lang="en-US" sz="2400" dirty="0" smtClean="0"/>
               <a:t> project</a:t>
             </a:r>
-            <a:endParaRPr lang="en-US" sz="2400" dirty="0" smtClean="0"/>
           </a:p>
           <a:p>
             <a:r>
@@ -16663,15 +16769,7 @@
                   <a:schemeClr val="accent2"/>
                 </a:solidFill>
               </a:rPr>
-              <a:t>Demo</a:t>
-            </a:r>
-            <a:r>
-              <a:rPr lang="en-US" b="1" dirty="0" smtClean="0">
-                <a:solidFill>
-                  <a:schemeClr val="accent2"/>
-                </a:solidFill>
-              </a:rPr>
-              <a:t>:</a:t>
+              <a:t>Demo:</a:t>
             </a:r>
             <a:r>
               <a:rPr lang="en-US" b="1" dirty="0">
@@ -19312,13 +19410,8 @@
             </a:pPr>
             <a:r>
               <a:rPr lang="en-US" dirty="0" smtClean="0"/>
-              <a:t>What’s on </a:t>
-            </a:r>
-            <a:r>
-              <a:rPr lang="en-US" dirty="0" smtClean="0"/>
-              <a:t>tap</a:t>
-            </a:r>
-            <a:endParaRPr lang="en-US" dirty="0" smtClean="0"/>
+              <a:t>What’s on tap</a:t>
+            </a:r>
           </a:p>
         </p:txBody>
       </p:sp>
@@ -20005,13 +20098,7 @@
               <a:rPr lang="en-US" b="1" dirty="0" smtClean="0">
                 <a:sym typeface="Wingdings" pitchFamily="2" charset="2"/>
               </a:rPr>
-              <a:t>ode</a:t>
-            </a:r>
-            <a:r>
-              <a:rPr lang="en-US" b="1" dirty="0" smtClean="0">
-                <a:sym typeface="Wingdings" pitchFamily="2" charset="2"/>
-              </a:rPr>
-              <a:t>?</a:t>
+              <a:t>ode?</a:t>
             </a:r>
             <a:endParaRPr lang="en-US" b="1" dirty="0">
               <a:sym typeface="Wingdings" pitchFamily="2" charset="2"/>
@@ -20178,185 +20265,6 @@
       </p:grpSpPr>
       <p:sp>
         <p:nvSpPr>
-          <p:cNvPr id="4" name="Rectangle 3"/>
-          <p:cNvSpPr txBox="1">
-            <a:spLocks noChangeArrowheads="1"/>
-          </p:cNvSpPr>
-          <p:nvPr/>
-        </p:nvSpPr>
-        <p:spPr bwMode="auto">
-          <a:xfrm>
-            <a:off x="581025" y="5324475"/>
-            <a:ext cx="8620125" cy="739775"/>
-          </a:xfrm>
-          <a:prstGeom prst="rect">
-            <a:avLst/>
-          </a:prstGeom>
-          <a:noFill/>
-          <a:ln w="9525">
-            <a:noFill/>
-            <a:miter lim="800000"/>
-            <a:headEnd/>
-            <a:tailEnd/>
-          </a:ln>
-        </p:spPr>
-        <p:txBody>
-          <a:bodyPr vert="horz" wrap="square" lIns="96646" tIns="48323" rIns="96646" bIns="48323" numCol="1" anchor="t" anchorCtr="0" compatLnSpc="1">
-            <a:prstTxWarp prst="textNoShape">
-              <a:avLst/>
-            </a:prstTxWarp>
-          </a:bodyPr>
-          <a:lstStyle>
-            <a:lvl1pPr marL="363538" indent="-363538" algn="l" defTabSz="966788" rtl="0" eaLnBrk="1" fontAlgn="base" hangingPunct="1">
-              <a:spcBef>
-                <a:spcPct val="20000"/>
-              </a:spcBef>
-              <a:spcAft>
-                <a:spcPct val="0"/>
-              </a:spcAft>
-              <a:buChar char="•"/>
-              <a:defRPr sz="2900">
-                <a:solidFill>
-                  <a:schemeClr val="tx1"/>
-                </a:solidFill>
-                <a:latin typeface="+mn-lt"/>
-                <a:ea typeface="+mn-ea"/>
-                <a:cs typeface="+mn-cs"/>
-              </a:defRPr>
-            </a:lvl1pPr>
-            <a:lvl2pPr marL="784225" indent="-301625" algn="l" defTabSz="966788" rtl="0" eaLnBrk="1" fontAlgn="base" hangingPunct="1">
-              <a:spcBef>
-                <a:spcPct val="20000"/>
-              </a:spcBef>
-              <a:spcAft>
-                <a:spcPct val="0"/>
-              </a:spcAft>
-              <a:buChar char="–"/>
-              <a:defRPr sz="2600">
-                <a:solidFill>
-                  <a:schemeClr val="tx1"/>
-                </a:solidFill>
-                <a:latin typeface="+mn-lt"/>
-              </a:defRPr>
-            </a:lvl2pPr>
-            <a:lvl3pPr marL="1208088" indent="-241300" algn="l" defTabSz="966788" rtl="0" eaLnBrk="1" fontAlgn="base" hangingPunct="1">
-              <a:spcBef>
-                <a:spcPct val="20000"/>
-              </a:spcBef>
-              <a:spcAft>
-                <a:spcPct val="0"/>
-              </a:spcAft>
-              <a:buChar char="•"/>
-              <a:defRPr sz="2100">
-                <a:solidFill>
-                  <a:schemeClr val="tx1"/>
-                </a:solidFill>
-                <a:latin typeface="+mn-lt"/>
-              </a:defRPr>
-            </a:lvl3pPr>
-            <a:lvl4pPr marL="1689100" indent="-238125" algn="l" defTabSz="966788" rtl="0" eaLnBrk="1" fontAlgn="base" hangingPunct="1">
-              <a:spcBef>
-                <a:spcPct val="20000"/>
-              </a:spcBef>
-              <a:spcAft>
-                <a:spcPct val="0"/>
-              </a:spcAft>
-              <a:buChar char="–"/>
-              <a:defRPr sz="2100">
-                <a:solidFill>
-                  <a:schemeClr val="tx1"/>
-                </a:solidFill>
-                <a:latin typeface="+mn-lt"/>
-              </a:defRPr>
-            </a:lvl4pPr>
-            <a:lvl5pPr marL="2174875" indent="-241300" algn="l" defTabSz="966788" rtl="0" eaLnBrk="1" fontAlgn="base" hangingPunct="1">
-              <a:spcBef>
-                <a:spcPct val="20000"/>
-              </a:spcBef>
-              <a:spcAft>
-                <a:spcPct val="0"/>
-              </a:spcAft>
-              <a:buChar char="»"/>
-              <a:defRPr sz="2100">
-                <a:solidFill>
-                  <a:schemeClr val="tx1"/>
-                </a:solidFill>
-                <a:latin typeface="+mn-lt"/>
-              </a:defRPr>
-            </a:lvl5pPr>
-            <a:lvl6pPr marL="2632075" indent="-241300" algn="l" defTabSz="966788" rtl="0" eaLnBrk="1" fontAlgn="base" hangingPunct="1">
-              <a:spcBef>
-                <a:spcPct val="20000"/>
-              </a:spcBef>
-              <a:spcAft>
-                <a:spcPct val="0"/>
-              </a:spcAft>
-              <a:buChar char="»"/>
-              <a:defRPr sz="2100">
-                <a:solidFill>
-                  <a:schemeClr val="tx1"/>
-                </a:solidFill>
-                <a:latin typeface="+mn-lt"/>
-              </a:defRPr>
-            </a:lvl6pPr>
-            <a:lvl7pPr marL="3089275" indent="-241300" algn="l" defTabSz="966788" rtl="0" eaLnBrk="1" fontAlgn="base" hangingPunct="1">
-              <a:spcBef>
-                <a:spcPct val="20000"/>
-              </a:spcBef>
-              <a:spcAft>
-                <a:spcPct val="0"/>
-              </a:spcAft>
-              <a:buChar char="»"/>
-              <a:defRPr sz="2100">
-                <a:solidFill>
-                  <a:schemeClr val="tx1"/>
-                </a:solidFill>
-                <a:latin typeface="+mn-lt"/>
-              </a:defRPr>
-            </a:lvl7pPr>
-            <a:lvl8pPr marL="3546475" indent="-241300" algn="l" defTabSz="966788" rtl="0" eaLnBrk="1" fontAlgn="base" hangingPunct="1">
-              <a:spcBef>
-                <a:spcPct val="20000"/>
-              </a:spcBef>
-              <a:spcAft>
-                <a:spcPct val="0"/>
-              </a:spcAft>
-              <a:buChar char="»"/>
-              <a:defRPr sz="2100">
-                <a:solidFill>
-                  <a:schemeClr val="tx1"/>
-                </a:solidFill>
-                <a:latin typeface="+mn-lt"/>
-              </a:defRPr>
-            </a:lvl8pPr>
-            <a:lvl9pPr marL="4003675" indent="-241300" algn="l" defTabSz="966788" rtl="0" eaLnBrk="1" fontAlgn="base" hangingPunct="1">
-              <a:spcBef>
-                <a:spcPct val="20000"/>
-              </a:spcBef>
-              <a:spcAft>
-                <a:spcPct val="0"/>
-              </a:spcAft>
-              <a:buChar char="»"/>
-              <a:defRPr sz="2100">
-                <a:solidFill>
-                  <a:schemeClr val="tx1"/>
-                </a:solidFill>
-                <a:latin typeface="+mn-lt"/>
-              </a:defRPr>
-            </a:lvl9pPr>
-          </a:lstStyle>
-          <a:p>
-            <a:pPr marL="0" indent="0" algn="ctr">
-              <a:buNone/>
-            </a:pPr>
-            <a:endParaRPr lang="en-US" dirty="0" smtClean="0">
-              <a:sym typeface="Wingdings" pitchFamily="2" charset="2"/>
-            </a:endParaRPr>
-          </a:p>
-        </p:txBody>
-      </p:sp>
-      <p:sp>
-        <p:nvSpPr>
           <p:cNvPr id="5" name="Rectangle 2"/>
           <p:cNvSpPr>
             <a:spLocks noGrp="1" noChangeArrowheads="1"/>
@@ -20391,13 +20299,7 @@
               <a:rPr lang="en-US" dirty="0" smtClean="0">
                 <a:sym typeface="Wingdings" pitchFamily="2" charset="2"/>
               </a:rPr>
-              <a:t> to </a:t>
-            </a:r>
-            <a:r>
-              <a:rPr lang="en-US" dirty="0" smtClean="0">
-                <a:sym typeface="Wingdings" pitchFamily="2" charset="2"/>
-              </a:rPr>
-              <a:t>change code?</a:t>
+              <a:t> to change code?</a:t>
             </a:r>
             <a:r>
               <a:rPr lang="en-US" dirty="0">
@@ -20606,11 +20508,7 @@
             </a:r>
             <a:r>
               <a:rPr lang="en-US" dirty="0" smtClean="0"/>
-              <a:t>to </a:t>
-            </a:r>
-            <a:r>
-              <a:rPr lang="en-US" dirty="0" smtClean="0"/>
-              <a:t>any of those questions</a:t>
+              <a:t>to any of those questions</a:t>
             </a:r>
           </a:p>
         </p:txBody>
@@ -20966,7 +20864,7 @@
         </p:blipFill>
         <p:spPr bwMode="auto">
           <a:xfrm>
-            <a:off x="1924163" y="1152524"/>
+            <a:off x="1924163" y="1103096"/>
             <a:ext cx="5572125" cy="4179094"/>
           </a:xfrm>
           <a:prstGeom prst="rect">
@@ -22535,52 +22433,6 @@
 </file>
 
 <file path=customXml/item1.xml><?xml version="1.0" encoding="utf-8"?>
-<?mso-contentType ?>
-<spe:Receivers xmlns:spe="http://schemas.microsoft.com/sharepoint/events">
-  <Receiver>
-    <Name>Document ID Generator</Name>
-    <Synchronization>Synchronous</Synchronization>
-    <Type>10001</Type>
-    <SequenceNumber>1000</SequenceNumber>
-    <Assembly>Microsoft.Office.DocumentManagement, Version=14.0.0.0, Culture=neutral, PublicKeyToken=71e9bce111e9429c</Assembly>
-    <Class>Microsoft.Office.DocumentManagement.Internal.DocIdHandler</Class>
-    <Data/>
-    <Filter/>
-  </Receiver>
-  <Receiver>
-    <Name>Document ID Generator</Name>
-    <Synchronization>Synchronous</Synchronization>
-    <Type>10002</Type>
-    <SequenceNumber>1001</SequenceNumber>
-    <Assembly>Microsoft.Office.DocumentManagement, Version=14.0.0.0, Culture=neutral, PublicKeyToken=71e9bce111e9429c</Assembly>
-    <Class>Microsoft.Office.DocumentManagement.Internal.DocIdHandler</Class>
-    <Data/>
-    <Filter/>
-  </Receiver>
-  <Receiver>
-    <Name>Document ID Generator</Name>
-    <Synchronization>Synchronous</Synchronization>
-    <Type>10004</Type>
-    <SequenceNumber>1002</SequenceNumber>
-    <Assembly>Microsoft.Office.DocumentManagement, Version=14.0.0.0, Culture=neutral, PublicKeyToken=71e9bce111e9429c</Assembly>
-    <Class>Microsoft.Office.DocumentManagement.Internal.DocIdHandler</Class>
-    <Data/>
-    <Filter/>
-  </Receiver>
-  <Receiver>
-    <Name>Document ID Generator</Name>
-    <Synchronization>Synchronous</Synchronization>
-    <Type>10006</Type>
-    <SequenceNumber>1003</SequenceNumber>
-    <Assembly>Microsoft.Office.DocumentManagement, Version=14.0.0.0, Culture=neutral, PublicKeyToken=71e9bce111e9429c</Assembly>
-    <Class>Microsoft.Office.DocumentManagement.Internal.DocIdHandler</Class>
-    <Data/>
-    <Filter/>
-  </Receiver>
-</spe:Receivers>
-</file>
-
-<file path=customXml/item2.xml><?xml version="1.0" encoding="utf-8"?>
 <ct:contentTypeSchema xmlns:ct="http://schemas.microsoft.com/office/2006/metadata/contentType" xmlns:ma="http://schemas.microsoft.com/office/2006/metadata/properties/metaAttributes" ct:_="" ma:_="" ma:contentTypeName="Document" ma:contentTypeID="0x0101004D2E750987EE2543B234B3A674D6BE3D" ma:contentTypeVersion="105" ma:contentTypeDescription="Create a new document." ma:contentTypeScope="" ma:versionID="62fa037737ae31885dcb260bd5c7d1f2">
   <xsd:schema xmlns:xsd="http://www.w3.org/2001/XMLSchema" xmlns:xs="http://www.w3.org/2001/XMLSchema" xmlns:p="http://schemas.microsoft.com/office/2006/metadata/properties" xmlns:ns2="1e37aee8-73ad-441e-bced-8b530ad9291b" xmlns:ns3="52ad97b0-86c1-49b5-b544-c488bf38e7c0" targetNamespace="http://schemas.microsoft.com/office/2006/metadata/properties" ma:root="true" ma:fieldsID="ce0d2501b4c25830d7e1734de94951c7" ns2:_="" ns3:_="">
     <xsd:import namespace="1e37aee8-73ad-441e-bced-8b530ad9291b"/>
@@ -22738,7 +22590,7 @@
 </ct:contentTypeSchema>
 </file>
 
-<file path=customXml/item3.xml><?xml version="1.0" encoding="utf-8"?>
+<file path=customXml/item2.xml><?xml version="1.0" encoding="utf-8"?>
 <?mso-contentType ?>
 <FormTemplates xmlns="http://schemas.microsoft.com/sharepoint/v3/contenttype/forms">
   <Display>DocumentLibraryForm</Display>
@@ -22747,7 +22599,7 @@
 </FormTemplates>
 </file>
 
-<file path=customXml/item4.xml><?xml version="1.0" encoding="utf-8"?>
+<file path=customXml/item3.xml><?xml version="1.0" encoding="utf-8"?>
 <p:properties xmlns:p="http://schemas.microsoft.com/office/2006/metadata/properties" xmlns:xsi="http://www.w3.org/2001/XMLSchema-instance" xmlns:pc="http://schemas.microsoft.com/office/infopath/2007/PartnerControls">
   <documentManagement>
     <Description0 xmlns="1e37aee8-73ad-441e-bced-8b530ad9291b">PowerPoint template with Microsoft Partner Network logo on it.</Description0>
@@ -22760,15 +22612,53 @@
 </p:properties>
 </file>
 
-<file path=customXml/itemProps1.xml><?xml version="1.0" encoding="utf-8"?>
-<ds:datastoreItem xmlns:ds="http://schemas.openxmlformats.org/officeDocument/2006/customXml" ds:itemID="{0068A067-F354-4585-8169-FC99DA836E1C}">
-  <ds:schemaRefs>
-    <ds:schemaRef ds:uri="http://schemas.microsoft.com/sharepoint/events"/>
-  </ds:schemaRefs>
-</ds:datastoreItem>
+<file path=customXml/item4.xml><?xml version="1.0" encoding="utf-8"?>
+<?mso-contentType ?>
+<spe:Receivers xmlns:spe="http://schemas.microsoft.com/sharepoint/events">
+  <Receiver>
+    <Name>Document ID Generator</Name>
+    <Synchronization>Synchronous</Synchronization>
+    <Type>10001</Type>
+    <SequenceNumber>1000</SequenceNumber>
+    <Assembly>Microsoft.Office.DocumentManagement, Version=14.0.0.0, Culture=neutral, PublicKeyToken=71e9bce111e9429c</Assembly>
+    <Class>Microsoft.Office.DocumentManagement.Internal.DocIdHandler</Class>
+    <Data/>
+    <Filter/>
+  </Receiver>
+  <Receiver>
+    <Name>Document ID Generator</Name>
+    <Synchronization>Synchronous</Synchronization>
+    <Type>10002</Type>
+    <SequenceNumber>1001</SequenceNumber>
+    <Assembly>Microsoft.Office.DocumentManagement, Version=14.0.0.0, Culture=neutral, PublicKeyToken=71e9bce111e9429c</Assembly>
+    <Class>Microsoft.Office.DocumentManagement.Internal.DocIdHandler</Class>
+    <Data/>
+    <Filter/>
+  </Receiver>
+  <Receiver>
+    <Name>Document ID Generator</Name>
+    <Synchronization>Synchronous</Synchronization>
+    <Type>10004</Type>
+    <SequenceNumber>1002</SequenceNumber>
+    <Assembly>Microsoft.Office.DocumentManagement, Version=14.0.0.0, Culture=neutral, PublicKeyToken=71e9bce111e9429c</Assembly>
+    <Class>Microsoft.Office.DocumentManagement.Internal.DocIdHandler</Class>
+    <Data/>
+    <Filter/>
+  </Receiver>
+  <Receiver>
+    <Name>Document ID Generator</Name>
+    <Synchronization>Synchronous</Synchronization>
+    <Type>10006</Type>
+    <SequenceNumber>1003</SequenceNumber>
+    <Assembly>Microsoft.Office.DocumentManagement, Version=14.0.0.0, Culture=neutral, PublicKeyToken=71e9bce111e9429c</Assembly>
+    <Class>Microsoft.Office.DocumentManagement.Internal.DocIdHandler</Class>
+    <Data/>
+    <Filter/>
+  </Receiver>
+</spe:Receivers>
 </file>
 
-<file path=customXml/itemProps2.xml><?xml version="1.0" encoding="utf-8"?>
+<file path=customXml/itemProps1.xml><?xml version="1.0" encoding="utf-8"?>
 <ds:datastoreItem xmlns:ds="http://schemas.openxmlformats.org/officeDocument/2006/customXml" ds:itemID="{B03FC495-EB61-4A2C-B8E7-345CEB92DF9F}">
   <ds:schemaRefs>
     <ds:schemaRef ds:uri="http://schemas.microsoft.com/office/2006/metadata/contentType"/>
@@ -22787,7 +22677,7 @@
 </ds:datastoreItem>
 </file>
 
-<file path=customXml/itemProps3.xml><?xml version="1.0" encoding="utf-8"?>
+<file path=customXml/itemProps2.xml><?xml version="1.0" encoding="utf-8"?>
 <ds:datastoreItem xmlns:ds="http://schemas.openxmlformats.org/officeDocument/2006/customXml" ds:itemID="{B6DBE1C9-0895-41F8-89A3-98DC40E912B0}">
   <ds:schemaRefs>
     <ds:schemaRef ds:uri="http://schemas.microsoft.com/sharepoint/v3/contenttype/forms"/>
@@ -22795,7 +22685,7 @@
 </ds:datastoreItem>
 </file>
 
-<file path=customXml/itemProps4.xml><?xml version="1.0" encoding="utf-8"?>
+<file path=customXml/itemProps3.xml><?xml version="1.0" encoding="utf-8"?>
 <ds:datastoreItem xmlns:ds="http://schemas.openxmlformats.org/officeDocument/2006/customXml" ds:itemID="{9F5040E5-4564-49C1-9147-56F1700A1C56}">
   <ds:schemaRefs>
     <ds:schemaRef ds:uri="http://schemas.microsoft.com/office/2006/documentManagement/types"/>
@@ -22810,4 +22700,12 @@
     <ds:schemaRef ds:uri="http://schemas.openxmlformats.org/package/2006/metadata/core-properties"/>
   </ds:schemaRefs>
 </ds:datastoreItem>
+</file>
+
+<file path=customXml/itemProps4.xml><?xml version="1.0" encoding="utf-8"?>
+<ds:datastoreItem xmlns:ds="http://schemas.openxmlformats.org/officeDocument/2006/customXml" ds:itemID="{0068A067-F354-4585-8169-FC99DA836E1C}">
+  <ds:schemaRefs>
+    <ds:schemaRef ds:uri="http://schemas.microsoft.com/sharepoint/events"/>
+  </ds:schemaRefs>
+</ds:datastoreItem>
 </file>
</xml_diff>